<commit_message>
Removed notes copied from an old presentation
</commit_message>
<xml_diff>
--- a/Pyowa.pptx
+++ b/Pyowa.pptx
@@ -211,7 +211,7 @@
           <a:p>
             <a:fld id="{B234A0A9-D2B9-4D21-8054-CE3E8EA3318B}" type="datetimeFigureOut">
               <a:rPr lang="en-US" smtClean="0"/>
-              <a:t>2/25/2019</a:t>
+              <a:t>3/6/2019</a:t>
             </a:fld>
             <a:endParaRPr lang="en-US"/>
           </a:p>
@@ -522,10 +522,7 @@
           <a:bodyPr/>
           <a:lstStyle/>
           <a:p>
-            <a:r>
-              <a:rPr lang="en-US" dirty="0"/>
-              <a:t>Hello, my name is Evan Hennis and this video will cover a project I created that demonstrates Linear Programming using the game Rock, Paper, Scissors as an example.</a:t>
-            </a:r>
+            <a:endParaRPr lang="en-US" dirty="0"/>
           </a:p>
         </p:txBody>
       </p:sp>
@@ -799,7 +796,7 @@
           <a:p>
             <a:fld id="{0BDAA80A-DCF6-416C-B4E9-4897677234EE}" type="datetimeFigureOut">
               <a:rPr lang="en-US" smtClean="0"/>
-              <a:t>2/25/2019</a:t>
+              <a:t>3/6/2019</a:t>
             </a:fld>
             <a:endParaRPr lang="en-US"/>
           </a:p>
@@ -997,7 +994,7 @@
           <a:p>
             <a:fld id="{0BDAA80A-DCF6-416C-B4E9-4897677234EE}" type="datetimeFigureOut">
               <a:rPr lang="en-US" smtClean="0"/>
-              <a:t>2/25/2019</a:t>
+              <a:t>3/6/2019</a:t>
             </a:fld>
             <a:endParaRPr lang="en-US"/>
           </a:p>
@@ -1205,7 +1202,7 @@
           <a:p>
             <a:fld id="{0BDAA80A-DCF6-416C-B4E9-4897677234EE}" type="datetimeFigureOut">
               <a:rPr lang="en-US" smtClean="0"/>
-              <a:t>2/25/2019</a:t>
+              <a:t>3/6/2019</a:t>
             </a:fld>
             <a:endParaRPr lang="en-US"/>
           </a:p>
@@ -1403,7 +1400,7 @@
           <a:p>
             <a:fld id="{0BDAA80A-DCF6-416C-B4E9-4897677234EE}" type="datetimeFigureOut">
               <a:rPr lang="en-US" smtClean="0"/>
-              <a:t>2/25/2019</a:t>
+              <a:t>3/6/2019</a:t>
             </a:fld>
             <a:endParaRPr lang="en-US"/>
           </a:p>
@@ -1678,7 +1675,7 @@
           <a:p>
             <a:fld id="{0BDAA80A-DCF6-416C-B4E9-4897677234EE}" type="datetimeFigureOut">
               <a:rPr lang="en-US" smtClean="0"/>
-              <a:t>2/25/2019</a:t>
+              <a:t>3/6/2019</a:t>
             </a:fld>
             <a:endParaRPr lang="en-US"/>
           </a:p>
@@ -1943,7 +1940,7 @@
           <a:p>
             <a:fld id="{0BDAA80A-DCF6-416C-B4E9-4897677234EE}" type="datetimeFigureOut">
               <a:rPr lang="en-US" smtClean="0"/>
-              <a:t>2/25/2019</a:t>
+              <a:t>3/6/2019</a:t>
             </a:fld>
             <a:endParaRPr lang="en-US"/>
           </a:p>
@@ -2355,7 +2352,7 @@
           <a:p>
             <a:fld id="{0BDAA80A-DCF6-416C-B4E9-4897677234EE}" type="datetimeFigureOut">
               <a:rPr lang="en-US" smtClean="0"/>
-              <a:t>2/25/2019</a:t>
+              <a:t>3/6/2019</a:t>
             </a:fld>
             <a:endParaRPr lang="en-US"/>
           </a:p>
@@ -2496,7 +2493,7 @@
           <a:p>
             <a:fld id="{0BDAA80A-DCF6-416C-B4E9-4897677234EE}" type="datetimeFigureOut">
               <a:rPr lang="en-US" smtClean="0"/>
-              <a:t>2/25/2019</a:t>
+              <a:t>3/6/2019</a:t>
             </a:fld>
             <a:endParaRPr lang="en-US"/>
           </a:p>
@@ -2609,7 +2606,7 @@
           <a:p>
             <a:fld id="{0BDAA80A-DCF6-416C-B4E9-4897677234EE}" type="datetimeFigureOut">
               <a:rPr lang="en-US" smtClean="0"/>
-              <a:t>2/25/2019</a:t>
+              <a:t>3/6/2019</a:t>
             </a:fld>
             <a:endParaRPr lang="en-US"/>
           </a:p>
@@ -2920,7 +2917,7 @@
           <a:p>
             <a:fld id="{0BDAA80A-DCF6-416C-B4E9-4897677234EE}" type="datetimeFigureOut">
               <a:rPr lang="en-US" smtClean="0"/>
-              <a:t>2/25/2019</a:t>
+              <a:t>3/6/2019</a:t>
             </a:fld>
             <a:endParaRPr lang="en-US"/>
           </a:p>
@@ -3208,7 +3205,7 @@
           <a:p>
             <a:fld id="{0BDAA80A-DCF6-416C-B4E9-4897677234EE}" type="datetimeFigureOut">
               <a:rPr lang="en-US" smtClean="0"/>
-              <a:t>2/25/2019</a:t>
+              <a:t>3/6/2019</a:t>
             </a:fld>
             <a:endParaRPr lang="en-US"/>
           </a:p>
@@ -3449,7 +3446,7 @@
           <a:p>
             <a:fld id="{0BDAA80A-DCF6-416C-B4E9-4897677234EE}" type="datetimeFigureOut">
               <a:rPr lang="en-US" smtClean="0"/>
-              <a:t>2/25/2019</a:t>
+              <a:t>3/6/2019</a:t>
             </a:fld>
             <a:endParaRPr lang="en-US"/>
           </a:p>

</xml_diff>